<commit_message>
Added Diagrams and other updates
</commit_message>
<xml_diff>
--- a/Fraudulent_Claim_Detection_BhawaniShankarMahapatra_BiniyamBelaynehDemisse_PPT.pptx
+++ b/Fraudulent_Claim_Detection_BhawaniShankarMahapatra_BiniyamBelaynehDemisse_PPT.pptx
@@ -4,6 +4,9 @@
   <p:sldMasterIdLst>
     <p:sldMasterId id="2147483648" r:id="rId1"/>
   </p:sldMasterIdLst>
+  <p:notesMasterIdLst>
+    <p:notesMasterId r:id="rId17"/>
+  </p:notesMasterIdLst>
   <p:sldIdLst>
     <p:sldId id="256" r:id="rId2"/>
     <p:sldId id="257" r:id="rId3"/>
@@ -15,8 +18,11 @@
     <p:sldId id="267" r:id="rId9"/>
     <p:sldId id="262" r:id="rId10"/>
     <p:sldId id="263" r:id="rId11"/>
-    <p:sldId id="264" r:id="rId12"/>
-    <p:sldId id="265" r:id="rId13"/>
+    <p:sldId id="268" r:id="rId12"/>
+    <p:sldId id="269" r:id="rId13"/>
+    <p:sldId id="270" r:id="rId14"/>
+    <p:sldId id="264" r:id="rId15"/>
+    <p:sldId id="265" r:id="rId16"/>
   </p:sldIdLst>
   <p:sldSz cx="9144000" cy="6858000" type="screen4x3"/>
   <p:notesSz cx="6858000" cy="9144000"/>
@@ -132,6 +138,440 @@
     </p:ext>
   </p:extLst>
 </p:presentation>
+</file>
+
+<file path=ppt/notesMasters/notesMaster1.xml><?xml version="1.0" encoding="utf-8"?>
+<p:notesMaster xmlns:a="http://schemas.openxmlformats.org/drawingml/2006/main" xmlns:r="http://schemas.openxmlformats.org/officeDocument/2006/relationships" xmlns:p="http://schemas.openxmlformats.org/presentationml/2006/main">
+  <p:cSld>
+    <p:bg>
+      <p:bgRef idx="1001">
+        <a:schemeClr val="bg1"/>
+      </p:bgRef>
+    </p:bg>
+    <p:spTree>
+      <p:nvGrpSpPr>
+        <p:cNvPr id="1" name=""/>
+        <p:cNvGrpSpPr/>
+        <p:nvPr/>
+      </p:nvGrpSpPr>
+      <p:grpSpPr>
+        <a:xfrm>
+          <a:off x="0" y="0"/>
+          <a:ext cx="0" cy="0"/>
+          <a:chOff x="0" y="0"/>
+          <a:chExt cx="0" cy="0"/>
+        </a:xfrm>
+      </p:grpSpPr>
+      <p:sp>
+        <p:nvSpPr>
+          <p:cNvPr id="2" name="Header Placeholder 1"/>
+          <p:cNvSpPr>
+            <a:spLocks noGrp="1"/>
+          </p:cNvSpPr>
+          <p:nvPr>
+            <p:ph type="hdr" sz="quarter"/>
+          </p:nvPr>
+        </p:nvSpPr>
+        <p:spPr>
+          <a:xfrm>
+            <a:off x="0" y="0"/>
+            <a:ext cx="2971800" cy="458788"/>
+          </a:xfrm>
+          <a:prstGeom prst="rect">
+            <a:avLst/>
+          </a:prstGeom>
+        </p:spPr>
+        <p:txBody>
+          <a:bodyPr vert="horz" lIns="91440" tIns="45720" rIns="91440" bIns="45720" rtlCol="0"/>
+          <a:lstStyle>
+            <a:lvl1pPr algn="l">
+              <a:defRPr sz="1200"/>
+            </a:lvl1pPr>
+          </a:lstStyle>
+          <a:p>
+            <a:endParaRPr lang="en-US"/>
+          </a:p>
+        </p:txBody>
+      </p:sp>
+      <p:sp>
+        <p:nvSpPr>
+          <p:cNvPr id="3" name="Date Placeholder 2"/>
+          <p:cNvSpPr>
+            <a:spLocks noGrp="1"/>
+          </p:cNvSpPr>
+          <p:nvPr>
+            <p:ph type="dt" idx="1"/>
+          </p:nvPr>
+        </p:nvSpPr>
+        <p:spPr>
+          <a:xfrm>
+            <a:off x="3884613" y="0"/>
+            <a:ext cx="2971800" cy="458788"/>
+          </a:xfrm>
+          <a:prstGeom prst="rect">
+            <a:avLst/>
+          </a:prstGeom>
+        </p:spPr>
+        <p:txBody>
+          <a:bodyPr vert="horz" lIns="91440" tIns="45720" rIns="91440" bIns="45720" rtlCol="0"/>
+          <a:lstStyle>
+            <a:lvl1pPr algn="r">
+              <a:defRPr sz="1200"/>
+            </a:lvl1pPr>
+          </a:lstStyle>
+          <a:p>
+            <a:fld id="{82ECBD2D-2E19-DE4E-8AAD-36F610C3632C}" type="datetimeFigureOut">
+              <a:rPr lang="en-US" smtClean="0"/>
+              <a:t>9/10/25</a:t>
+            </a:fld>
+            <a:endParaRPr lang="en-US"/>
+          </a:p>
+        </p:txBody>
+      </p:sp>
+      <p:sp>
+        <p:nvSpPr>
+          <p:cNvPr id="4" name="Slide Image Placeholder 3"/>
+          <p:cNvSpPr>
+            <a:spLocks noGrp="1" noRot="1" noChangeAspect="1"/>
+          </p:cNvSpPr>
+          <p:nvPr>
+            <p:ph type="sldImg" idx="2"/>
+          </p:nvPr>
+        </p:nvSpPr>
+        <p:spPr>
+          <a:xfrm>
+            <a:off x="1371600" y="1143000"/>
+            <a:ext cx="4114800" cy="3086100"/>
+          </a:xfrm>
+          <a:prstGeom prst="rect">
+            <a:avLst/>
+          </a:prstGeom>
+          <a:noFill/>
+          <a:ln w="12700">
+            <a:solidFill>
+              <a:prstClr val="black"/>
+            </a:solidFill>
+          </a:ln>
+        </p:spPr>
+        <p:txBody>
+          <a:bodyPr vert="horz" lIns="91440" tIns="45720" rIns="91440" bIns="45720" rtlCol="0" anchor="ctr"/>
+          <a:lstStyle/>
+          <a:p>
+            <a:endParaRPr lang="en-US"/>
+          </a:p>
+        </p:txBody>
+      </p:sp>
+      <p:sp>
+        <p:nvSpPr>
+          <p:cNvPr id="5" name="Notes Placeholder 4"/>
+          <p:cNvSpPr>
+            <a:spLocks noGrp="1"/>
+          </p:cNvSpPr>
+          <p:nvPr>
+            <p:ph type="body" sz="quarter" idx="3"/>
+          </p:nvPr>
+        </p:nvSpPr>
+        <p:spPr>
+          <a:xfrm>
+            <a:off x="685800" y="4400550"/>
+            <a:ext cx="5486400" cy="3600450"/>
+          </a:xfrm>
+          <a:prstGeom prst="rect">
+            <a:avLst/>
+          </a:prstGeom>
+        </p:spPr>
+        <p:txBody>
+          <a:bodyPr vert="horz" lIns="91440" tIns="45720" rIns="91440" bIns="45720" rtlCol="0"/>
+          <a:lstStyle/>
+          <a:p>
+            <a:pPr lvl="0"/>
+            <a:r>
+              <a:rPr lang="en-GB"/>
+              <a:t>Click to edit Master text styles</a:t>
+            </a:r>
+          </a:p>
+          <a:p>
+            <a:pPr lvl="1"/>
+            <a:r>
+              <a:rPr lang="en-GB"/>
+              <a:t>Second level</a:t>
+            </a:r>
+          </a:p>
+          <a:p>
+            <a:pPr lvl="2"/>
+            <a:r>
+              <a:rPr lang="en-GB"/>
+              <a:t>Third level</a:t>
+            </a:r>
+          </a:p>
+          <a:p>
+            <a:pPr lvl="3"/>
+            <a:r>
+              <a:rPr lang="en-GB"/>
+              <a:t>Fourth level</a:t>
+            </a:r>
+          </a:p>
+          <a:p>
+            <a:pPr lvl="4"/>
+            <a:r>
+              <a:rPr lang="en-GB"/>
+              <a:t>Fifth level</a:t>
+            </a:r>
+            <a:endParaRPr lang="en-US"/>
+          </a:p>
+        </p:txBody>
+      </p:sp>
+      <p:sp>
+        <p:nvSpPr>
+          <p:cNvPr id="6" name="Footer Placeholder 5"/>
+          <p:cNvSpPr>
+            <a:spLocks noGrp="1"/>
+          </p:cNvSpPr>
+          <p:nvPr>
+            <p:ph type="ftr" sz="quarter" idx="4"/>
+          </p:nvPr>
+        </p:nvSpPr>
+        <p:spPr>
+          <a:xfrm>
+            <a:off x="0" y="8685213"/>
+            <a:ext cx="2971800" cy="458787"/>
+          </a:xfrm>
+          <a:prstGeom prst="rect">
+            <a:avLst/>
+          </a:prstGeom>
+        </p:spPr>
+        <p:txBody>
+          <a:bodyPr vert="horz" lIns="91440" tIns="45720" rIns="91440" bIns="45720" rtlCol="0" anchor="b"/>
+          <a:lstStyle>
+            <a:lvl1pPr algn="l">
+              <a:defRPr sz="1200"/>
+            </a:lvl1pPr>
+          </a:lstStyle>
+          <a:p>
+            <a:endParaRPr lang="en-US"/>
+          </a:p>
+        </p:txBody>
+      </p:sp>
+      <p:sp>
+        <p:nvSpPr>
+          <p:cNvPr id="7" name="Slide Number Placeholder 6"/>
+          <p:cNvSpPr>
+            <a:spLocks noGrp="1"/>
+          </p:cNvSpPr>
+          <p:nvPr>
+            <p:ph type="sldNum" sz="quarter" idx="5"/>
+          </p:nvPr>
+        </p:nvSpPr>
+        <p:spPr>
+          <a:xfrm>
+            <a:off x="3884613" y="8685213"/>
+            <a:ext cx="2971800" cy="458787"/>
+          </a:xfrm>
+          <a:prstGeom prst="rect">
+            <a:avLst/>
+          </a:prstGeom>
+        </p:spPr>
+        <p:txBody>
+          <a:bodyPr vert="horz" lIns="91440" tIns="45720" rIns="91440" bIns="45720" rtlCol="0" anchor="b"/>
+          <a:lstStyle>
+            <a:lvl1pPr algn="r">
+              <a:defRPr sz="1200"/>
+            </a:lvl1pPr>
+          </a:lstStyle>
+          <a:p>
+            <a:fld id="{2A42C802-8F9A-0542-BC44-F64CDFFEB880}" type="slidenum">
+              <a:rPr lang="en-US" smtClean="0"/>
+              <a:t>‹#›</a:t>
+            </a:fld>
+            <a:endParaRPr lang="en-US"/>
+          </a:p>
+        </p:txBody>
+      </p:sp>
+    </p:spTree>
+    <p:extLst>
+      <p:ext uri="{BB962C8B-B14F-4D97-AF65-F5344CB8AC3E}">
+        <p14:creationId xmlns:p14="http://schemas.microsoft.com/office/powerpoint/2010/main" val="3437448867"/>
+      </p:ext>
+    </p:extLst>
+  </p:cSld>
+  <p:clrMap bg1="lt1" tx1="dk1" bg2="lt2" tx2="dk2" accent1="accent1" accent2="accent2" accent3="accent3" accent4="accent4" accent5="accent5" accent6="accent6" hlink="hlink" folHlink="folHlink"/>
+  <p:notesStyle>
+    <a:lvl1pPr marL="0" algn="l" defTabSz="914400" rtl="0" eaLnBrk="1" latinLnBrk="0" hangingPunct="1">
+      <a:defRPr sz="1200" kern="1200">
+        <a:solidFill>
+          <a:schemeClr val="tx1"/>
+        </a:solidFill>
+        <a:latin typeface="+mn-lt"/>
+        <a:ea typeface="+mn-ea"/>
+        <a:cs typeface="+mn-cs"/>
+      </a:defRPr>
+    </a:lvl1pPr>
+    <a:lvl2pPr marL="457200" algn="l" defTabSz="914400" rtl="0" eaLnBrk="1" latinLnBrk="0" hangingPunct="1">
+      <a:defRPr sz="1200" kern="1200">
+        <a:solidFill>
+          <a:schemeClr val="tx1"/>
+        </a:solidFill>
+        <a:latin typeface="+mn-lt"/>
+        <a:ea typeface="+mn-ea"/>
+        <a:cs typeface="+mn-cs"/>
+      </a:defRPr>
+    </a:lvl2pPr>
+    <a:lvl3pPr marL="914400" algn="l" defTabSz="914400" rtl="0" eaLnBrk="1" latinLnBrk="0" hangingPunct="1">
+      <a:defRPr sz="1200" kern="1200">
+        <a:solidFill>
+          <a:schemeClr val="tx1"/>
+        </a:solidFill>
+        <a:latin typeface="+mn-lt"/>
+        <a:ea typeface="+mn-ea"/>
+        <a:cs typeface="+mn-cs"/>
+      </a:defRPr>
+    </a:lvl3pPr>
+    <a:lvl4pPr marL="1371600" algn="l" defTabSz="914400" rtl="0" eaLnBrk="1" latinLnBrk="0" hangingPunct="1">
+      <a:defRPr sz="1200" kern="1200">
+        <a:solidFill>
+          <a:schemeClr val="tx1"/>
+        </a:solidFill>
+        <a:latin typeface="+mn-lt"/>
+        <a:ea typeface="+mn-ea"/>
+        <a:cs typeface="+mn-cs"/>
+      </a:defRPr>
+    </a:lvl4pPr>
+    <a:lvl5pPr marL="1828800" algn="l" defTabSz="914400" rtl="0" eaLnBrk="1" latinLnBrk="0" hangingPunct="1">
+      <a:defRPr sz="1200" kern="1200">
+        <a:solidFill>
+          <a:schemeClr val="tx1"/>
+        </a:solidFill>
+        <a:latin typeface="+mn-lt"/>
+        <a:ea typeface="+mn-ea"/>
+        <a:cs typeface="+mn-cs"/>
+      </a:defRPr>
+    </a:lvl5pPr>
+    <a:lvl6pPr marL="2286000" algn="l" defTabSz="914400" rtl="0" eaLnBrk="1" latinLnBrk="0" hangingPunct="1">
+      <a:defRPr sz="1200" kern="1200">
+        <a:solidFill>
+          <a:schemeClr val="tx1"/>
+        </a:solidFill>
+        <a:latin typeface="+mn-lt"/>
+        <a:ea typeface="+mn-ea"/>
+        <a:cs typeface="+mn-cs"/>
+      </a:defRPr>
+    </a:lvl6pPr>
+    <a:lvl7pPr marL="2743200" algn="l" defTabSz="914400" rtl="0" eaLnBrk="1" latinLnBrk="0" hangingPunct="1">
+      <a:defRPr sz="1200" kern="1200">
+        <a:solidFill>
+          <a:schemeClr val="tx1"/>
+        </a:solidFill>
+        <a:latin typeface="+mn-lt"/>
+        <a:ea typeface="+mn-ea"/>
+        <a:cs typeface="+mn-cs"/>
+      </a:defRPr>
+    </a:lvl7pPr>
+    <a:lvl8pPr marL="3200400" algn="l" defTabSz="914400" rtl="0" eaLnBrk="1" latinLnBrk="0" hangingPunct="1">
+      <a:defRPr sz="1200" kern="1200">
+        <a:solidFill>
+          <a:schemeClr val="tx1"/>
+        </a:solidFill>
+        <a:latin typeface="+mn-lt"/>
+        <a:ea typeface="+mn-ea"/>
+        <a:cs typeface="+mn-cs"/>
+      </a:defRPr>
+    </a:lvl8pPr>
+    <a:lvl9pPr marL="3657600" algn="l" defTabSz="914400" rtl="0" eaLnBrk="1" latinLnBrk="0" hangingPunct="1">
+      <a:defRPr sz="1200" kern="1200">
+        <a:solidFill>
+          <a:schemeClr val="tx1"/>
+        </a:solidFill>
+        <a:latin typeface="+mn-lt"/>
+        <a:ea typeface="+mn-ea"/>
+        <a:cs typeface="+mn-cs"/>
+      </a:defRPr>
+    </a:lvl9pPr>
+  </p:notesStyle>
+</p:notesMaster>
+</file>
+
+<file path=ppt/notesSlides/notesSlide1.xml><?xml version="1.0" encoding="utf-8"?>
+<p:notes xmlns:a="http://schemas.openxmlformats.org/drawingml/2006/main" xmlns:r="http://schemas.openxmlformats.org/officeDocument/2006/relationships" xmlns:p="http://schemas.openxmlformats.org/presentationml/2006/main">
+  <p:cSld>
+    <p:spTree>
+      <p:nvGrpSpPr>
+        <p:cNvPr id="1" name=""/>
+        <p:cNvGrpSpPr/>
+        <p:nvPr/>
+      </p:nvGrpSpPr>
+      <p:grpSpPr>
+        <a:xfrm>
+          <a:off x="0" y="0"/>
+          <a:ext cx="0" cy="0"/>
+          <a:chOff x="0" y="0"/>
+          <a:chExt cx="0" cy="0"/>
+        </a:xfrm>
+      </p:grpSpPr>
+      <p:sp>
+        <p:nvSpPr>
+          <p:cNvPr id="2" name="Slide Image Placeholder 1"/>
+          <p:cNvSpPr>
+            <a:spLocks noGrp="1" noRot="1" noChangeAspect="1"/>
+          </p:cNvSpPr>
+          <p:nvPr>
+            <p:ph type="sldImg"/>
+          </p:nvPr>
+        </p:nvSpPr>
+        <p:spPr/>
+      </p:sp>
+      <p:sp>
+        <p:nvSpPr>
+          <p:cNvPr id="3" name="Notes Placeholder 2"/>
+          <p:cNvSpPr>
+            <a:spLocks noGrp="1"/>
+          </p:cNvSpPr>
+          <p:nvPr>
+            <p:ph type="body" idx="1"/>
+          </p:nvPr>
+        </p:nvSpPr>
+        <p:spPr/>
+        <p:txBody>
+          <a:bodyPr/>
+          <a:lstStyle/>
+          <a:p>
+            <a:endParaRPr lang="en-US" dirty="0"/>
+          </a:p>
+        </p:txBody>
+      </p:sp>
+      <p:sp>
+        <p:nvSpPr>
+          <p:cNvPr id="4" name="Slide Number Placeholder 3"/>
+          <p:cNvSpPr>
+            <a:spLocks noGrp="1"/>
+          </p:cNvSpPr>
+          <p:nvPr>
+            <p:ph type="sldNum" sz="quarter" idx="5"/>
+          </p:nvPr>
+        </p:nvSpPr>
+        <p:spPr/>
+        <p:txBody>
+          <a:bodyPr/>
+          <a:lstStyle/>
+          <a:p>
+            <a:fld id="{2A42C802-8F9A-0542-BC44-F64CDFFEB880}" type="slidenum">
+              <a:rPr lang="en-US" smtClean="0"/>
+              <a:t>8</a:t>
+            </a:fld>
+            <a:endParaRPr lang="en-US"/>
+          </a:p>
+        </p:txBody>
+      </p:sp>
+    </p:spTree>
+    <p:extLst>
+      <p:ext uri="{BB962C8B-B14F-4D97-AF65-F5344CB8AC3E}">
+        <p14:creationId xmlns:p14="http://schemas.microsoft.com/office/powerpoint/2010/main" val="2924672489"/>
+      </p:ext>
+    </p:extLst>
+  </p:cSld>
+  <p:clrMapOvr>
+    <a:masterClrMapping/>
+  </p:clrMapOvr>
+</p:notes>
 </file>
 
 <file path=ppt/slideLayouts/slideLayout1.xml><?xml version="1.0" encoding="utf-8"?>
@@ -3261,6 +3701,668 @@
   <p:cSld>
     <p:spTree>
       <p:nvGrpSpPr>
+        <p:cNvPr id="1" name="">
+          <a:extLst>
+            <a:ext uri="{FF2B5EF4-FFF2-40B4-BE49-F238E27FC236}">
+              <a16:creationId xmlns:a16="http://schemas.microsoft.com/office/drawing/2014/main" id="{A54DDDAC-1BF5-4124-7706-622B368DFB3D}"/>
+            </a:ext>
+          </a:extLst>
+        </p:cNvPr>
+        <p:cNvGrpSpPr/>
+        <p:nvPr/>
+      </p:nvGrpSpPr>
+      <p:grpSpPr>
+        <a:xfrm>
+          <a:off x="0" y="0"/>
+          <a:ext cx="0" cy="0"/>
+          <a:chOff x="0" y="0"/>
+          <a:chExt cx="0" cy="0"/>
+        </a:xfrm>
+      </p:grpSpPr>
+      <p:sp>
+        <p:nvSpPr>
+          <p:cNvPr id="2" name="Title 1">
+            <a:extLst>
+              <a:ext uri="{FF2B5EF4-FFF2-40B4-BE49-F238E27FC236}">
+                <a16:creationId xmlns:a16="http://schemas.microsoft.com/office/drawing/2014/main" id="{8F791C0A-2436-3E8A-180E-B3A6AF8DC7A3}"/>
+              </a:ext>
+            </a:extLst>
+          </p:cNvPr>
+          <p:cNvSpPr>
+            <a:spLocks noGrp="1"/>
+          </p:cNvSpPr>
+          <p:nvPr>
+            <p:ph type="title"/>
+          </p:nvPr>
+        </p:nvSpPr>
+        <p:spPr/>
+        <p:txBody>
+          <a:bodyPr>
+            <a:normAutofit fontScale="90000"/>
+          </a:bodyPr>
+          <a:lstStyle/>
+          <a:p>
+            <a:r>
+              <a:rPr dirty="0"/>
+              <a:t>Model Building</a:t>
+            </a:r>
+            <a:r>
+              <a:rPr lang="en-US" dirty="0"/>
+              <a:t>-Logistics Regression</a:t>
+            </a:r>
+            <a:endParaRPr dirty="0"/>
+          </a:p>
+        </p:txBody>
+      </p:sp>
+      <p:pic>
+        <p:nvPicPr>
+          <p:cNvPr id="4" name="Content Placeholder 3">
+            <a:extLst>
+              <a:ext uri="{FF2B5EF4-FFF2-40B4-BE49-F238E27FC236}">
+                <a16:creationId xmlns:a16="http://schemas.microsoft.com/office/drawing/2014/main" id="{22E3175F-0729-A352-88FB-FCFA1B72B3CD}"/>
+              </a:ext>
+            </a:extLst>
+          </p:cNvPr>
+          <p:cNvPicPr>
+            <a:picLocks noGrp="1" noChangeAspect="1"/>
+          </p:cNvPicPr>
+          <p:nvPr>
+            <p:ph idx="1"/>
+          </p:nvPr>
+        </p:nvPicPr>
+        <p:blipFill>
+          <a:blip r:embed="rId2"/>
+          <a:stretch>
+            <a:fillRect/>
+          </a:stretch>
+        </p:blipFill>
+        <p:spPr>
+          <a:xfrm>
+            <a:off x="4114800" y="1279149"/>
+            <a:ext cx="3937000" cy="2348665"/>
+          </a:xfrm>
+          <a:prstGeom prst="rect">
+            <a:avLst/>
+          </a:prstGeom>
+        </p:spPr>
+      </p:pic>
+      <p:sp>
+        <p:nvSpPr>
+          <p:cNvPr id="5" name="TextBox 4">
+            <a:extLst>
+              <a:ext uri="{FF2B5EF4-FFF2-40B4-BE49-F238E27FC236}">
+                <a16:creationId xmlns:a16="http://schemas.microsoft.com/office/drawing/2014/main" id="{4B33D1CF-10A2-0D03-8888-5C02DE39717D}"/>
+              </a:ext>
+            </a:extLst>
+          </p:cNvPr>
+          <p:cNvSpPr txBox="1"/>
+          <p:nvPr/>
+        </p:nvSpPr>
+        <p:spPr>
+          <a:xfrm>
+            <a:off x="1473200" y="1926849"/>
+            <a:ext cx="2692212" cy="3139321"/>
+          </a:xfrm>
+          <a:prstGeom prst="rect">
+            <a:avLst/>
+          </a:prstGeom>
+          <a:noFill/>
+        </p:spPr>
+        <p:txBody>
+          <a:bodyPr wrap="none" rtlCol="0">
+            <a:spAutoFit/>
+          </a:bodyPr>
+          <a:lstStyle/>
+          <a:p>
+            <a:r>
+              <a:rPr lang="en-IN" dirty="0"/>
+              <a:t>True Negatives: 477 </a:t>
+            </a:r>
+          </a:p>
+          <a:p>
+            <a:r>
+              <a:rPr lang="en-IN" dirty="0"/>
+              <a:t>False Positives: 50</a:t>
+            </a:r>
+          </a:p>
+          <a:p>
+            <a:r>
+              <a:rPr lang="en-IN" dirty="0"/>
+              <a:t>False Negatives: 50</a:t>
+            </a:r>
+          </a:p>
+          <a:p>
+            <a:r>
+              <a:rPr lang="en-IN" dirty="0"/>
+              <a:t>True Positives: 477</a:t>
+            </a:r>
+          </a:p>
+          <a:p>
+            <a:r>
+              <a:rPr lang="en-IN" dirty="0"/>
+              <a:t>Sensitivity (Recall): 0.9051 </a:t>
+            </a:r>
+          </a:p>
+          <a:p>
+            <a:r>
+              <a:rPr lang="en-IN" dirty="0"/>
+              <a:t>Specificity: 0.9051 </a:t>
+            </a:r>
+          </a:p>
+          <a:p>
+            <a:r>
+              <a:rPr lang="en-IN" dirty="0"/>
+              <a:t>Precision: 0.9051 </a:t>
+            </a:r>
+          </a:p>
+          <a:p>
+            <a:r>
+              <a:rPr lang="en-IN" dirty="0"/>
+              <a:t>Recall: 0.9051 </a:t>
+            </a:r>
+          </a:p>
+          <a:p>
+            <a:r>
+              <a:rPr lang="en-IN" dirty="0"/>
+              <a:t>F1 Score: 0.9051 </a:t>
+            </a:r>
+          </a:p>
+          <a:p>
+            <a:br>
+              <a:rPr lang="en-IN" dirty="0"/>
+            </a:br>
+            <a:endParaRPr lang="en-IN" dirty="0"/>
+          </a:p>
+        </p:txBody>
+      </p:sp>
+      <p:pic>
+        <p:nvPicPr>
+          <p:cNvPr id="6" name="Picture 5">
+            <a:extLst>
+              <a:ext uri="{FF2B5EF4-FFF2-40B4-BE49-F238E27FC236}">
+                <a16:creationId xmlns:a16="http://schemas.microsoft.com/office/drawing/2014/main" id="{F3E860C2-6657-9FA9-063D-C8C3C4F55431}"/>
+              </a:ext>
+            </a:extLst>
+          </p:cNvPr>
+          <p:cNvPicPr>
+            <a:picLocks noChangeAspect="1"/>
+          </p:cNvPicPr>
+          <p:nvPr/>
+        </p:nvPicPr>
+        <p:blipFill>
+          <a:blip r:embed="rId3"/>
+          <a:stretch>
+            <a:fillRect/>
+          </a:stretch>
+        </p:blipFill>
+        <p:spPr>
+          <a:xfrm>
+            <a:off x="4230064" y="3691314"/>
+            <a:ext cx="3955086" cy="3081811"/>
+          </a:xfrm>
+          <a:prstGeom prst="rect">
+            <a:avLst/>
+          </a:prstGeom>
+        </p:spPr>
+      </p:pic>
+    </p:spTree>
+    <p:extLst>
+      <p:ext uri="{BB962C8B-B14F-4D97-AF65-F5344CB8AC3E}">
+        <p14:creationId xmlns:p14="http://schemas.microsoft.com/office/powerpoint/2010/main" val="1667952459"/>
+      </p:ext>
+    </p:extLst>
+  </p:cSld>
+  <p:clrMapOvr>
+    <a:masterClrMapping/>
+  </p:clrMapOvr>
+</p:sld>
+</file>
+
+<file path=ppt/slides/slide12.xml><?xml version="1.0" encoding="utf-8"?>
+<p:sld xmlns:a="http://schemas.openxmlformats.org/drawingml/2006/main" xmlns:r="http://schemas.openxmlformats.org/officeDocument/2006/relationships" xmlns:p="http://schemas.openxmlformats.org/presentationml/2006/main">
+  <p:cSld>
+    <p:spTree>
+      <p:nvGrpSpPr>
+        <p:cNvPr id="1" name="">
+          <a:extLst>
+            <a:ext uri="{FF2B5EF4-FFF2-40B4-BE49-F238E27FC236}">
+              <a16:creationId xmlns:a16="http://schemas.microsoft.com/office/drawing/2014/main" id="{E9A30653-B42B-2EEF-2DA8-A4B42EEBCA24}"/>
+            </a:ext>
+          </a:extLst>
+        </p:cNvPr>
+        <p:cNvGrpSpPr/>
+        <p:nvPr/>
+      </p:nvGrpSpPr>
+      <p:grpSpPr>
+        <a:xfrm>
+          <a:off x="0" y="0"/>
+          <a:ext cx="0" cy="0"/>
+          <a:chOff x="0" y="0"/>
+          <a:chExt cx="0" cy="0"/>
+        </a:xfrm>
+      </p:grpSpPr>
+      <p:sp>
+        <p:nvSpPr>
+          <p:cNvPr id="2" name="Title 1">
+            <a:extLst>
+              <a:ext uri="{FF2B5EF4-FFF2-40B4-BE49-F238E27FC236}">
+                <a16:creationId xmlns:a16="http://schemas.microsoft.com/office/drawing/2014/main" id="{0005F5F0-CEE5-8A96-1EAC-AC3D4B0C2EDB}"/>
+              </a:ext>
+            </a:extLst>
+          </p:cNvPr>
+          <p:cNvSpPr>
+            <a:spLocks noGrp="1"/>
+          </p:cNvSpPr>
+          <p:nvPr>
+            <p:ph type="title"/>
+          </p:nvPr>
+        </p:nvSpPr>
+        <p:spPr/>
+        <p:txBody>
+          <a:bodyPr>
+            <a:normAutofit fontScale="90000"/>
+          </a:bodyPr>
+          <a:lstStyle/>
+          <a:p>
+            <a:r>
+              <a:rPr dirty="0"/>
+              <a:t>Model Building</a:t>
+            </a:r>
+            <a:r>
+              <a:rPr lang="en-US" dirty="0"/>
+              <a:t>-Logistics Regression</a:t>
+            </a:r>
+            <a:endParaRPr dirty="0"/>
+          </a:p>
+        </p:txBody>
+      </p:sp>
+      <p:sp>
+        <p:nvSpPr>
+          <p:cNvPr id="5" name="TextBox 4">
+            <a:extLst>
+              <a:ext uri="{FF2B5EF4-FFF2-40B4-BE49-F238E27FC236}">
+                <a16:creationId xmlns:a16="http://schemas.microsoft.com/office/drawing/2014/main" id="{DEF8CA39-2F4D-D3C2-19AC-49548F2D3E53}"/>
+              </a:ext>
+            </a:extLst>
+          </p:cNvPr>
+          <p:cNvSpPr txBox="1"/>
+          <p:nvPr/>
+        </p:nvSpPr>
+        <p:spPr>
+          <a:xfrm>
+            <a:off x="1473200" y="1926849"/>
+            <a:ext cx="2692212" cy="3139321"/>
+          </a:xfrm>
+          <a:prstGeom prst="rect">
+            <a:avLst/>
+          </a:prstGeom>
+          <a:noFill/>
+        </p:spPr>
+        <p:txBody>
+          <a:bodyPr wrap="none" rtlCol="0">
+            <a:spAutoFit/>
+          </a:bodyPr>
+          <a:lstStyle/>
+          <a:p>
+            <a:r>
+              <a:rPr lang="en-IN" dirty="0"/>
+              <a:t>True Negatives: 477 </a:t>
+            </a:r>
+          </a:p>
+          <a:p>
+            <a:r>
+              <a:rPr lang="en-IN" dirty="0"/>
+              <a:t>False Positives: 50</a:t>
+            </a:r>
+          </a:p>
+          <a:p>
+            <a:r>
+              <a:rPr lang="en-IN" dirty="0"/>
+              <a:t>False Negatives: 50</a:t>
+            </a:r>
+          </a:p>
+          <a:p>
+            <a:r>
+              <a:rPr lang="en-IN" dirty="0"/>
+              <a:t>True Positives: 477</a:t>
+            </a:r>
+          </a:p>
+          <a:p>
+            <a:r>
+              <a:rPr lang="en-IN" dirty="0"/>
+              <a:t>Sensitivity (Recall): 0.9051 </a:t>
+            </a:r>
+          </a:p>
+          <a:p>
+            <a:r>
+              <a:rPr lang="en-IN" dirty="0"/>
+              <a:t>Specificity: 0.9051 </a:t>
+            </a:r>
+          </a:p>
+          <a:p>
+            <a:r>
+              <a:rPr lang="en-IN" dirty="0"/>
+              <a:t>Precision: 0.9051 </a:t>
+            </a:r>
+          </a:p>
+          <a:p>
+            <a:r>
+              <a:rPr lang="en-IN" dirty="0"/>
+              <a:t>Recall: 0.9051 </a:t>
+            </a:r>
+          </a:p>
+          <a:p>
+            <a:r>
+              <a:rPr lang="en-IN" dirty="0"/>
+              <a:t>F1 Score: 0.9051 </a:t>
+            </a:r>
+          </a:p>
+          <a:p>
+            <a:br>
+              <a:rPr lang="en-IN" dirty="0"/>
+            </a:br>
+            <a:endParaRPr lang="en-IN" dirty="0"/>
+          </a:p>
+        </p:txBody>
+      </p:sp>
+      <p:pic>
+        <p:nvPicPr>
+          <p:cNvPr id="9" name="Picture 8">
+            <a:extLst>
+              <a:ext uri="{FF2B5EF4-FFF2-40B4-BE49-F238E27FC236}">
+                <a16:creationId xmlns:a16="http://schemas.microsoft.com/office/drawing/2014/main" id="{A7D1A8E7-784D-A320-5E66-BCD45CFB914A}"/>
+              </a:ext>
+            </a:extLst>
+          </p:cNvPr>
+          <p:cNvPicPr>
+            <a:picLocks noChangeAspect="1"/>
+          </p:cNvPicPr>
+          <p:nvPr/>
+        </p:nvPicPr>
+        <p:blipFill>
+          <a:blip r:embed="rId2"/>
+          <a:stretch>
+            <a:fillRect/>
+          </a:stretch>
+        </p:blipFill>
+        <p:spPr>
+          <a:xfrm>
+            <a:off x="4572000" y="3916155"/>
+            <a:ext cx="3708212" cy="2300030"/>
+          </a:xfrm>
+          <a:prstGeom prst="rect">
+            <a:avLst/>
+          </a:prstGeom>
+        </p:spPr>
+      </p:pic>
+      <p:pic>
+        <p:nvPicPr>
+          <p:cNvPr id="10" name="Picture 9">
+            <a:extLst>
+              <a:ext uri="{FF2B5EF4-FFF2-40B4-BE49-F238E27FC236}">
+                <a16:creationId xmlns:a16="http://schemas.microsoft.com/office/drawing/2014/main" id="{052BEBE8-73E1-F644-418F-BBA94D11E536}"/>
+              </a:ext>
+            </a:extLst>
+          </p:cNvPr>
+          <p:cNvPicPr>
+            <a:picLocks noChangeAspect="1"/>
+          </p:cNvPicPr>
+          <p:nvPr/>
+        </p:nvPicPr>
+        <p:blipFill>
+          <a:blip r:embed="rId3"/>
+          <a:stretch>
+            <a:fillRect/>
+          </a:stretch>
+        </p:blipFill>
+        <p:spPr>
+          <a:xfrm>
+            <a:off x="4500544" y="1153030"/>
+            <a:ext cx="3373080" cy="2670151"/>
+          </a:xfrm>
+          <a:prstGeom prst="rect">
+            <a:avLst/>
+          </a:prstGeom>
+        </p:spPr>
+      </p:pic>
+    </p:spTree>
+    <p:extLst>
+      <p:ext uri="{BB962C8B-B14F-4D97-AF65-F5344CB8AC3E}">
+        <p14:creationId xmlns:p14="http://schemas.microsoft.com/office/powerpoint/2010/main" val="2213372858"/>
+      </p:ext>
+    </p:extLst>
+  </p:cSld>
+  <p:clrMapOvr>
+    <a:masterClrMapping/>
+  </p:clrMapOvr>
+</p:sld>
+</file>
+
+<file path=ppt/slides/slide13.xml><?xml version="1.0" encoding="utf-8"?>
+<p:sld xmlns:a="http://schemas.openxmlformats.org/drawingml/2006/main" xmlns:r="http://schemas.openxmlformats.org/officeDocument/2006/relationships" xmlns:p="http://schemas.openxmlformats.org/presentationml/2006/main">
+  <p:cSld>
+    <p:spTree>
+      <p:nvGrpSpPr>
+        <p:cNvPr id="1" name="">
+          <a:extLst>
+            <a:ext uri="{FF2B5EF4-FFF2-40B4-BE49-F238E27FC236}">
+              <a16:creationId xmlns:a16="http://schemas.microsoft.com/office/drawing/2014/main" id="{98A62C28-FC6F-2410-4FB3-A0CE1AA28028}"/>
+            </a:ext>
+          </a:extLst>
+        </p:cNvPr>
+        <p:cNvGrpSpPr/>
+        <p:nvPr/>
+      </p:nvGrpSpPr>
+      <p:grpSpPr>
+        <a:xfrm>
+          <a:off x="0" y="0"/>
+          <a:ext cx="0" cy="0"/>
+          <a:chOff x="0" y="0"/>
+          <a:chExt cx="0" cy="0"/>
+        </a:xfrm>
+      </p:grpSpPr>
+      <p:sp>
+        <p:nvSpPr>
+          <p:cNvPr id="2" name="Title 1">
+            <a:extLst>
+              <a:ext uri="{FF2B5EF4-FFF2-40B4-BE49-F238E27FC236}">
+                <a16:creationId xmlns:a16="http://schemas.microsoft.com/office/drawing/2014/main" id="{093E3925-22FC-07D1-8FE5-CC06B0506FAA}"/>
+              </a:ext>
+            </a:extLst>
+          </p:cNvPr>
+          <p:cNvSpPr>
+            <a:spLocks noGrp="1"/>
+          </p:cNvSpPr>
+          <p:nvPr>
+            <p:ph type="title"/>
+          </p:nvPr>
+        </p:nvSpPr>
+        <p:spPr/>
+        <p:txBody>
+          <a:bodyPr>
+            <a:normAutofit/>
+          </a:bodyPr>
+          <a:lstStyle/>
+          <a:p>
+            <a:r>
+              <a:rPr dirty="0"/>
+              <a:t>Model Building</a:t>
+            </a:r>
+            <a:r>
+              <a:rPr lang="en-US" dirty="0"/>
+              <a:t>-Random Forest</a:t>
+            </a:r>
+            <a:endParaRPr dirty="0"/>
+          </a:p>
+        </p:txBody>
+      </p:sp>
+      <p:sp>
+        <p:nvSpPr>
+          <p:cNvPr id="5" name="TextBox 4">
+            <a:extLst>
+              <a:ext uri="{FF2B5EF4-FFF2-40B4-BE49-F238E27FC236}">
+                <a16:creationId xmlns:a16="http://schemas.microsoft.com/office/drawing/2014/main" id="{E263C005-6656-2495-1270-B88A615A5091}"/>
+              </a:ext>
+            </a:extLst>
+          </p:cNvPr>
+          <p:cNvSpPr txBox="1"/>
+          <p:nvPr/>
+        </p:nvSpPr>
+        <p:spPr>
+          <a:xfrm>
+            <a:off x="1473200" y="1926849"/>
+            <a:ext cx="2692212" cy="3139321"/>
+          </a:xfrm>
+          <a:prstGeom prst="rect">
+            <a:avLst/>
+          </a:prstGeom>
+          <a:noFill/>
+        </p:spPr>
+        <p:txBody>
+          <a:bodyPr wrap="none" rtlCol="0">
+            <a:spAutoFit/>
+          </a:bodyPr>
+          <a:lstStyle/>
+          <a:p>
+            <a:r>
+              <a:rPr lang="en-IN" dirty="0"/>
+              <a:t>True Negatives: 203 </a:t>
+            </a:r>
+          </a:p>
+          <a:p>
+            <a:r>
+              <a:rPr lang="en-IN" dirty="0"/>
+              <a:t>False Positives: 23</a:t>
+            </a:r>
+          </a:p>
+          <a:p>
+            <a:r>
+              <a:rPr lang="en-IN" dirty="0"/>
+              <a:t>False Negatives: 34</a:t>
+            </a:r>
+          </a:p>
+          <a:p>
+            <a:r>
+              <a:rPr lang="en-IN" dirty="0"/>
+              <a:t>True Positives: 40</a:t>
+            </a:r>
+          </a:p>
+          <a:p>
+            <a:r>
+              <a:rPr lang="en-IN" dirty="0"/>
+              <a:t>Sensitivity (Recall): 0.5405 </a:t>
+            </a:r>
+          </a:p>
+          <a:p>
+            <a:r>
+              <a:rPr lang="en-IN" dirty="0"/>
+              <a:t>Specificity: 0.8982</a:t>
+            </a:r>
+          </a:p>
+          <a:p>
+            <a:r>
+              <a:rPr lang="en-IN" dirty="0"/>
+              <a:t>Precision: 0.6349</a:t>
+            </a:r>
+          </a:p>
+          <a:p>
+            <a:r>
+              <a:rPr lang="en-IN" dirty="0"/>
+              <a:t>Recall: 0.5405 </a:t>
+            </a:r>
+          </a:p>
+          <a:p>
+            <a:r>
+              <a:rPr lang="en-IN" dirty="0"/>
+              <a:t>F1 Score: 0.5839 </a:t>
+            </a:r>
+          </a:p>
+          <a:p>
+            <a:br>
+              <a:rPr lang="en-IN" dirty="0"/>
+            </a:br>
+            <a:endParaRPr lang="en-IN" dirty="0"/>
+          </a:p>
+        </p:txBody>
+      </p:sp>
+      <p:pic>
+        <p:nvPicPr>
+          <p:cNvPr id="3" name="Picture 2">
+            <a:extLst>
+              <a:ext uri="{FF2B5EF4-FFF2-40B4-BE49-F238E27FC236}">
+                <a16:creationId xmlns:a16="http://schemas.microsoft.com/office/drawing/2014/main" id="{9941D809-8B26-DD82-7D9F-89C68734687E}"/>
+              </a:ext>
+            </a:extLst>
+          </p:cNvPr>
+          <p:cNvPicPr>
+            <a:picLocks noChangeAspect="1"/>
+          </p:cNvPicPr>
+          <p:nvPr/>
+        </p:nvPicPr>
+        <p:blipFill>
+          <a:blip r:embed="rId2"/>
+          <a:stretch>
+            <a:fillRect/>
+          </a:stretch>
+        </p:blipFill>
+        <p:spPr>
+          <a:xfrm>
+            <a:off x="4978590" y="1199499"/>
+            <a:ext cx="2876360" cy="2581348"/>
+          </a:xfrm>
+          <a:prstGeom prst="rect">
+            <a:avLst/>
+          </a:prstGeom>
+        </p:spPr>
+      </p:pic>
+      <p:pic>
+        <p:nvPicPr>
+          <p:cNvPr id="4" name="Picture 3">
+            <a:extLst>
+              <a:ext uri="{FF2B5EF4-FFF2-40B4-BE49-F238E27FC236}">
+                <a16:creationId xmlns:a16="http://schemas.microsoft.com/office/drawing/2014/main" id="{6914D1E2-EE61-A263-ED48-7B36D5FE51B8}"/>
+              </a:ext>
+            </a:extLst>
+          </p:cNvPr>
+          <p:cNvPicPr>
+            <a:picLocks noChangeAspect="1"/>
+          </p:cNvPicPr>
+          <p:nvPr/>
+        </p:nvPicPr>
+        <p:blipFill>
+          <a:blip r:embed="rId3"/>
+          <a:stretch>
+            <a:fillRect/>
+          </a:stretch>
+        </p:blipFill>
+        <p:spPr>
+          <a:xfrm>
+            <a:off x="4051300" y="3833059"/>
+            <a:ext cx="4184650" cy="2728781"/>
+          </a:xfrm>
+          <a:prstGeom prst="rect">
+            <a:avLst/>
+          </a:prstGeom>
+        </p:spPr>
+      </p:pic>
+    </p:spTree>
+    <p:extLst>
+      <p:ext uri="{BB962C8B-B14F-4D97-AF65-F5344CB8AC3E}">
+        <p14:creationId xmlns:p14="http://schemas.microsoft.com/office/powerpoint/2010/main" val="2641699497"/>
+      </p:ext>
+    </p:extLst>
+  </p:cSld>
+  <p:clrMapOvr>
+    <a:masterClrMapping/>
+  </p:clrMapOvr>
+</p:sld>
+</file>
+
+<file path=ppt/slides/slide14.xml><?xml version="1.0" encoding="utf-8"?>
+<p:sld xmlns:a="http://schemas.openxmlformats.org/drawingml/2006/main" xmlns:r="http://schemas.openxmlformats.org/officeDocument/2006/relationships" xmlns:p="http://schemas.openxmlformats.org/presentationml/2006/main">
+  <p:cSld>
+    <p:spTree>
+      <p:nvGrpSpPr>
         <p:cNvPr id="1" name=""/>
         <p:cNvGrpSpPr/>
         <p:nvPr/>
@@ -3314,6 +4416,9 @@
           <a:bodyPr/>
           <a:lstStyle/>
           <a:p>
+            <a:pPr marL="0" indent="0">
+              <a:buNone/>
+            </a:pPr>
             <a:r>
               <a:rPr dirty="0"/>
               <a:t>Logistic Regression performed better at fraud detection.</a:t>
@@ -3340,7 +4445,7 @@
           <p:nvPr>
             <p:extLst>
               <p:ext uri="{D42A27DB-BD31-4B8C-83A1-F6EECF244321}">
-                <p14:modId xmlns:p14="http://schemas.microsoft.com/office/powerpoint/2010/main" val="2407545536"/>
+                <p14:modId xmlns:p14="http://schemas.microsoft.com/office/powerpoint/2010/main" val="1423510495"/>
               </p:ext>
             </p:extLst>
           </p:nvPr>
@@ -3445,7 +4550,7 @@
                     <a:p>
                       <a:r>
                         <a:rPr lang="en-US" dirty="0"/>
-                        <a:t>83.7%</a:t>
+                        <a:t>83.4%</a:t>
                       </a:r>
                     </a:p>
                   </a:txBody>
@@ -3535,7 +4640,10 @@
                     <a:bodyPr/>
                     <a:lstStyle/>
                     <a:p>
-                      <a:endParaRPr lang="en-US"/>
+                      <a:r>
+                        <a:rPr lang="en-US" dirty="0"/>
+                        <a:t>89.4%</a:t>
+                      </a:r>
                     </a:p>
                   </a:txBody>
                   <a:tcPr/>
@@ -3545,7 +4653,10 @@
                     <a:bodyPr/>
                     <a:lstStyle/>
                     <a:p>
-                      <a:endParaRPr lang="en-US"/>
+                      <a:r>
+                        <a:rPr lang="en-US" dirty="0"/>
+                        <a:t>89.9%</a:t>
+                      </a:r>
                     </a:p>
                   </a:txBody>
                   <a:tcPr/>
@@ -3575,7 +4686,10 @@
                     <a:bodyPr/>
                     <a:lstStyle/>
                     <a:p>
-                      <a:endParaRPr lang="en-US"/>
+                      <a:r>
+                        <a:rPr lang="en-US" dirty="0"/>
+                        <a:t>67.1%</a:t>
+                      </a:r>
                     </a:p>
                   </a:txBody>
                   <a:tcPr/>
@@ -3585,7 +4699,10 @@
                     <a:bodyPr/>
                     <a:lstStyle/>
                     <a:p>
-                      <a:endParaRPr lang="en-US"/>
+                      <a:r>
+                        <a:rPr lang="en-US" dirty="0"/>
+                        <a:t>54.1%</a:t>
+                      </a:r>
                     </a:p>
                   </a:txBody>
                   <a:tcPr/>
@@ -3654,7 +4771,7 @@
 </p:sld>
 </file>
 
-<file path=ppt/slides/slide12.xml><?xml version="1.0" encoding="utf-8"?>
+<file path=ppt/slides/slide15.xml><?xml version="1.0" encoding="utf-8"?>
 <p:sld xmlns:a="http://schemas.openxmlformats.org/drawingml/2006/main" xmlns:r="http://schemas.openxmlformats.org/officeDocument/2006/relationships" xmlns:p="http://schemas.openxmlformats.org/presentationml/2006/main">
   <p:cSld>
     <p:spTree>
@@ -4307,7 +5424,7 @@
           </p:nvPr>
         </p:nvPicPr>
         <p:blipFill>
-          <a:blip r:embed="rId2"/>
+          <a:blip r:embed="rId3"/>
           <a:stretch>
             <a:fillRect/>
           </a:stretch>
@@ -4337,7 +5454,7 @@
         <p:spPr>
           <a:xfrm>
             <a:off x="647700" y="1619250"/>
-            <a:ext cx="381836" cy="369332"/>
+            <a:ext cx="2927350" cy="3046988"/>
           </a:xfrm>
           <a:prstGeom prst="rect">
             <a:avLst/>
@@ -4345,15 +5462,93 @@
           <a:noFill/>
         </p:spPr>
         <p:txBody>
-          <a:bodyPr wrap="none" rtlCol="0">
+          <a:bodyPr wrap="square" rtlCol="0">
             <a:spAutoFit/>
           </a:bodyPr>
           <a:lstStyle/>
           <a:p>
             <a:r>
-              <a:rPr lang="en-US" dirty="0"/>
-              <a:t>Hi</a:t>
-            </a:r>
+              <a:rPr lang="en-IN" sz="1200" b="1" dirty="0"/>
+              <a:t>Correlation Insights</a:t>
+            </a:r>
+          </a:p>
+          <a:p>
+            <a:r>
+              <a:rPr lang="en-IN" sz="1200" b="1" dirty="0"/>
+              <a:t>Age ↔ </a:t>
+            </a:r>
+            <a:r>
+              <a:rPr lang="en-IN" sz="1200" b="1" dirty="0" err="1"/>
+              <a:t>Months_as_customer</a:t>
+            </a:r>
+            <a:r>
+              <a:rPr lang="en-IN" sz="1200" dirty="0"/>
+              <a:t>: Highly correlated (0.92) → redundancy risk</a:t>
+            </a:r>
+          </a:p>
+          <a:p>
+            <a:endParaRPr lang="en-IN" sz="1200" dirty="0"/>
+          </a:p>
+          <a:p>
+            <a:r>
+              <a:rPr lang="en-IN" sz="1200" b="1" dirty="0"/>
+              <a:t>Claim amounts</a:t>
+            </a:r>
+            <a:r>
+              <a:rPr lang="en-IN" sz="1200" dirty="0"/>
+              <a:t> (total, injury, property, vehicle) → strongly correlated</a:t>
+            </a:r>
+          </a:p>
+          <a:p>
+            <a:endParaRPr lang="en-IN" sz="1200" dirty="0"/>
+          </a:p>
+          <a:p>
+            <a:r>
+              <a:rPr lang="en-IN" sz="1200" dirty="0"/>
+              <a:t>Most other variables = weak correlations (independent predictors)</a:t>
+            </a:r>
+          </a:p>
+          <a:p>
+            <a:endParaRPr lang="en-IN" sz="1200" dirty="0"/>
+          </a:p>
+          <a:p>
+            <a:r>
+              <a:rPr lang="en-IN" sz="1200" dirty="0"/>
+              <a:t>Unique contributors: </a:t>
+            </a:r>
+            <a:r>
+              <a:rPr lang="en-IN" sz="1200" b="1" dirty="0" err="1"/>
+              <a:t>policy_deductible</a:t>
+            </a:r>
+            <a:r>
+              <a:rPr lang="en-IN" sz="1200" b="1" dirty="0"/>
+              <a:t>, </a:t>
+            </a:r>
+            <a:r>
+              <a:rPr lang="en-IN" sz="1200" b="1" dirty="0" err="1"/>
+              <a:t>umbrella_limit</a:t>
+            </a:r>
+            <a:r>
+              <a:rPr lang="en-IN" sz="1200" b="1" dirty="0"/>
+              <a:t>, </a:t>
+            </a:r>
+            <a:r>
+              <a:rPr lang="en-IN" sz="1200" b="1" dirty="0" err="1"/>
+              <a:t>incident_hour</a:t>
+            </a:r>
+            <a:endParaRPr lang="en-IN" sz="1200" b="1" dirty="0"/>
+          </a:p>
+          <a:p>
+            <a:endParaRPr lang="en-IN" sz="1200" dirty="0"/>
+          </a:p>
+          <a:p>
+            <a:r>
+              <a:rPr lang="en-IN" sz="1200" dirty="0"/>
+              <a:t>Action: Handle multicollinearity (feature selection/dimensionality reduction)</a:t>
+            </a:r>
+          </a:p>
+          <a:p>
+            <a:endParaRPr lang="en-US" sz="1200" dirty="0"/>
           </a:p>
         </p:txBody>
       </p:sp>
@@ -4770,4 +5965,319 @@
   </a:objectDefaults>
   <a:extraClrSchemeLst/>
 </a:theme>
+</file>
+
+<file path=ppt/theme/theme2.xml><?xml version="1.0" encoding="utf-8"?>
+<a:theme xmlns:a="http://schemas.openxmlformats.org/drawingml/2006/main" name="Office Theme">
+  <a:themeElements>
+    <a:clrScheme name="Office">
+      <a:dk1>
+        <a:sysClr val="windowText" lastClr="000000"/>
+      </a:dk1>
+      <a:lt1>
+        <a:sysClr val="window" lastClr="FFFFFF"/>
+      </a:lt1>
+      <a:dk2>
+        <a:srgbClr val="0E2841"/>
+      </a:dk2>
+      <a:lt2>
+        <a:srgbClr val="E8E8E8"/>
+      </a:lt2>
+      <a:accent1>
+        <a:srgbClr val="156082"/>
+      </a:accent1>
+      <a:accent2>
+        <a:srgbClr val="E97132"/>
+      </a:accent2>
+      <a:accent3>
+        <a:srgbClr val="196B24"/>
+      </a:accent3>
+      <a:accent4>
+        <a:srgbClr val="0F9ED5"/>
+      </a:accent4>
+      <a:accent5>
+        <a:srgbClr val="A02B93"/>
+      </a:accent5>
+      <a:accent6>
+        <a:srgbClr val="4EA72E"/>
+      </a:accent6>
+      <a:hlink>
+        <a:srgbClr val="467886"/>
+      </a:hlink>
+      <a:folHlink>
+        <a:srgbClr val="96607D"/>
+      </a:folHlink>
+    </a:clrScheme>
+    <a:fontScheme name="Office">
+      <a:majorFont>
+        <a:latin typeface="Aptos Display" panose="02110004020202020204"/>
+        <a:ea typeface=""/>
+        <a:cs typeface=""/>
+        <a:font script="Jpan" typeface="游ゴシック Light"/>
+        <a:font script="Hang" typeface="맑은 고딕"/>
+        <a:font script="Hans" typeface="等线 Light"/>
+        <a:font script="Hant" typeface="新細明體"/>
+        <a:font script="Arab" typeface="Times New Roman"/>
+        <a:font script="Hebr" typeface="Times New Roman"/>
+        <a:font script="Thai" typeface="Angsana New"/>
+        <a:font script="Ethi" typeface="Nyala"/>
+        <a:font script="Beng" typeface="Vrinda"/>
+        <a:font script="Gujr" typeface="Shruti"/>
+        <a:font script="Khmr" typeface="MoolBoran"/>
+        <a:font script="Knda" typeface="Tunga"/>
+        <a:font script="Guru" typeface="Raavi"/>
+        <a:font script="Cans" typeface="Euphemia"/>
+        <a:font script="Cher" typeface="Plantagenet Cherokee"/>
+        <a:font script="Yiii" typeface="Microsoft Yi Baiti"/>
+        <a:font script="Tibt" typeface="Microsoft Himalaya"/>
+        <a:font script="Thaa" typeface="MV Boli"/>
+        <a:font script="Deva" typeface="Mangal"/>
+        <a:font script="Telu" typeface="Gautami"/>
+        <a:font script="Taml" typeface="Latha"/>
+        <a:font script="Syrc" typeface="Estrangelo Edessa"/>
+        <a:font script="Orya" typeface="Kalinga"/>
+        <a:font script="Mlym" typeface="Kartika"/>
+        <a:font script="Laoo" typeface="DokChampa"/>
+        <a:font script="Sinh" typeface="Iskoola Pota"/>
+        <a:font script="Mong" typeface="Mongolian Baiti"/>
+        <a:font script="Viet" typeface="Times New Roman"/>
+        <a:font script="Uigh" typeface="Microsoft Uighur"/>
+        <a:font script="Geor" typeface="Sylfaen"/>
+        <a:font script="Armn" typeface="Arial"/>
+        <a:font script="Bugi" typeface="Leelawadee UI"/>
+        <a:font script="Bopo" typeface="Microsoft JhengHei"/>
+        <a:font script="Java" typeface="Javanese Text"/>
+        <a:font script="Lisu" typeface="Segoe UI"/>
+        <a:font script="Mymr" typeface="Myanmar Text"/>
+        <a:font script="Nkoo" typeface="Ebrima"/>
+        <a:font script="Olck" typeface="Nirmala UI"/>
+        <a:font script="Osma" typeface="Ebrima"/>
+        <a:font script="Phag" typeface="Phagspa"/>
+        <a:font script="Syrn" typeface="Estrangelo Edessa"/>
+        <a:font script="Syrj" typeface="Estrangelo Edessa"/>
+        <a:font script="Syre" typeface="Estrangelo Edessa"/>
+        <a:font script="Sora" typeface="Nirmala UI"/>
+        <a:font script="Tale" typeface="Microsoft Tai Le"/>
+        <a:font script="Talu" typeface="Microsoft New Tai Lue"/>
+        <a:font script="Tfng" typeface="Ebrima"/>
+      </a:majorFont>
+      <a:minorFont>
+        <a:latin typeface="Aptos" panose="02110004020202020204"/>
+        <a:ea typeface=""/>
+        <a:cs typeface=""/>
+        <a:font script="Jpan" typeface="游ゴシック"/>
+        <a:font script="Hang" typeface="맑은 고딕"/>
+        <a:font script="Hans" typeface="等线"/>
+        <a:font script="Hant" typeface="新細明體"/>
+        <a:font script="Arab" typeface="Arial"/>
+        <a:font script="Hebr" typeface="Arial"/>
+        <a:font script="Thai" typeface="Cordia New"/>
+        <a:font script="Ethi" typeface="Nyala"/>
+        <a:font script="Beng" typeface="Vrinda"/>
+        <a:font script="Gujr" typeface="Shruti"/>
+        <a:font script="Khmr" typeface="DaunPenh"/>
+        <a:font script="Knda" typeface="Tunga"/>
+        <a:font script="Guru" typeface="Raavi"/>
+        <a:font script="Cans" typeface="Euphemia"/>
+        <a:font script="Cher" typeface="Plantagenet Cherokee"/>
+        <a:font script="Yiii" typeface="Microsoft Yi Baiti"/>
+        <a:font script="Tibt" typeface="Microsoft Himalaya"/>
+        <a:font script="Thaa" typeface="MV Boli"/>
+        <a:font script="Deva" typeface="Mangal"/>
+        <a:font script="Telu" typeface="Gautami"/>
+        <a:font script="Taml" typeface="Latha"/>
+        <a:font script="Syrc" typeface="Estrangelo Edessa"/>
+        <a:font script="Orya" typeface="Kalinga"/>
+        <a:font script="Mlym" typeface="Kartika"/>
+        <a:font script="Laoo" typeface="DokChampa"/>
+        <a:font script="Sinh" typeface="Iskoola Pota"/>
+        <a:font script="Mong" typeface="Mongolian Baiti"/>
+        <a:font script="Viet" typeface="Arial"/>
+        <a:font script="Uigh" typeface="Microsoft Uighur"/>
+        <a:font script="Geor" typeface="Sylfaen"/>
+        <a:font script="Armn" typeface="Arial"/>
+        <a:font script="Bugi" typeface="Leelawadee UI"/>
+        <a:font script="Bopo" typeface="Microsoft JhengHei"/>
+        <a:font script="Java" typeface="Javanese Text"/>
+        <a:font script="Lisu" typeface="Segoe UI"/>
+        <a:font script="Mymr" typeface="Myanmar Text"/>
+        <a:font script="Nkoo" typeface="Ebrima"/>
+        <a:font script="Olck" typeface="Nirmala UI"/>
+        <a:font script="Osma" typeface="Ebrima"/>
+        <a:font script="Phag" typeface="Phagspa"/>
+        <a:font script="Syrn" typeface="Estrangelo Edessa"/>
+        <a:font script="Syrj" typeface="Estrangelo Edessa"/>
+        <a:font script="Syre" typeface="Estrangelo Edessa"/>
+        <a:font script="Sora" typeface="Nirmala UI"/>
+        <a:font script="Tale" typeface="Microsoft Tai Le"/>
+        <a:font script="Talu" typeface="Microsoft New Tai Lue"/>
+        <a:font script="Tfng" typeface="Ebrima"/>
+      </a:minorFont>
+    </a:fontScheme>
+    <a:fmtScheme name="Office">
+      <a:fillStyleLst>
+        <a:solidFill>
+          <a:schemeClr val="phClr"/>
+        </a:solidFill>
+        <a:gradFill rotWithShape="1">
+          <a:gsLst>
+            <a:gs pos="0">
+              <a:schemeClr val="phClr">
+                <a:lumMod val="110000"/>
+                <a:satMod val="105000"/>
+                <a:tint val="67000"/>
+              </a:schemeClr>
+            </a:gs>
+            <a:gs pos="50000">
+              <a:schemeClr val="phClr">
+                <a:lumMod val="105000"/>
+                <a:satMod val="103000"/>
+                <a:tint val="73000"/>
+              </a:schemeClr>
+            </a:gs>
+            <a:gs pos="100000">
+              <a:schemeClr val="phClr">
+                <a:lumMod val="105000"/>
+                <a:satMod val="109000"/>
+                <a:tint val="81000"/>
+              </a:schemeClr>
+            </a:gs>
+          </a:gsLst>
+          <a:lin ang="5400000" scaled="0"/>
+        </a:gradFill>
+        <a:gradFill rotWithShape="1">
+          <a:gsLst>
+            <a:gs pos="0">
+              <a:schemeClr val="phClr">
+                <a:satMod val="103000"/>
+                <a:lumMod val="102000"/>
+                <a:tint val="94000"/>
+              </a:schemeClr>
+            </a:gs>
+            <a:gs pos="50000">
+              <a:schemeClr val="phClr">
+                <a:satMod val="110000"/>
+                <a:lumMod val="100000"/>
+                <a:shade val="100000"/>
+              </a:schemeClr>
+            </a:gs>
+            <a:gs pos="100000">
+              <a:schemeClr val="phClr">
+                <a:lumMod val="99000"/>
+                <a:satMod val="120000"/>
+                <a:shade val="78000"/>
+              </a:schemeClr>
+            </a:gs>
+          </a:gsLst>
+          <a:lin ang="5400000" scaled="0"/>
+        </a:gradFill>
+      </a:fillStyleLst>
+      <a:lnStyleLst>
+        <a:ln w="12700" cap="flat" cmpd="sng" algn="ctr">
+          <a:solidFill>
+            <a:schemeClr val="phClr"/>
+          </a:solidFill>
+          <a:prstDash val="solid"/>
+          <a:miter lim="800000"/>
+        </a:ln>
+        <a:ln w="19050" cap="flat" cmpd="sng" algn="ctr">
+          <a:solidFill>
+            <a:schemeClr val="phClr"/>
+          </a:solidFill>
+          <a:prstDash val="solid"/>
+          <a:miter lim="800000"/>
+        </a:ln>
+        <a:ln w="25400" cap="flat" cmpd="sng" algn="ctr">
+          <a:solidFill>
+            <a:schemeClr val="phClr"/>
+          </a:solidFill>
+          <a:prstDash val="solid"/>
+          <a:miter lim="800000"/>
+        </a:ln>
+      </a:lnStyleLst>
+      <a:effectStyleLst>
+        <a:effectStyle>
+          <a:effectLst/>
+        </a:effectStyle>
+        <a:effectStyle>
+          <a:effectLst/>
+        </a:effectStyle>
+        <a:effectStyle>
+          <a:effectLst>
+            <a:outerShdw blurRad="57150" dist="19050" dir="5400000" algn="ctr" rotWithShape="0">
+              <a:srgbClr val="000000">
+                <a:alpha val="63000"/>
+              </a:srgbClr>
+            </a:outerShdw>
+          </a:effectLst>
+        </a:effectStyle>
+      </a:effectStyleLst>
+      <a:bgFillStyleLst>
+        <a:solidFill>
+          <a:schemeClr val="phClr"/>
+        </a:solidFill>
+        <a:solidFill>
+          <a:schemeClr val="phClr">
+            <a:tint val="95000"/>
+            <a:satMod val="170000"/>
+          </a:schemeClr>
+        </a:solidFill>
+        <a:gradFill rotWithShape="1">
+          <a:gsLst>
+            <a:gs pos="0">
+              <a:schemeClr val="phClr">
+                <a:tint val="93000"/>
+                <a:satMod val="150000"/>
+                <a:shade val="98000"/>
+                <a:lumMod val="102000"/>
+              </a:schemeClr>
+            </a:gs>
+            <a:gs pos="50000">
+              <a:schemeClr val="phClr">
+                <a:tint val="98000"/>
+                <a:satMod val="130000"/>
+                <a:shade val="90000"/>
+                <a:lumMod val="103000"/>
+              </a:schemeClr>
+            </a:gs>
+            <a:gs pos="100000">
+              <a:schemeClr val="phClr">
+                <a:shade val="63000"/>
+                <a:satMod val="120000"/>
+              </a:schemeClr>
+            </a:gs>
+          </a:gsLst>
+          <a:lin ang="5400000" scaled="0"/>
+        </a:gradFill>
+      </a:bgFillStyleLst>
+    </a:fmtScheme>
+  </a:themeElements>
+  <a:objectDefaults>
+    <a:lnDef>
+      <a:spPr/>
+      <a:bodyPr/>
+      <a:lstStyle/>
+      <a:style>
+        <a:lnRef idx="2">
+          <a:schemeClr val="accent1"/>
+        </a:lnRef>
+        <a:fillRef idx="0">
+          <a:schemeClr val="accent1"/>
+        </a:fillRef>
+        <a:effectRef idx="1">
+          <a:schemeClr val="accent1"/>
+        </a:effectRef>
+        <a:fontRef idx="minor">
+          <a:schemeClr val="tx1"/>
+        </a:fontRef>
+      </a:style>
+    </a:lnDef>
+  </a:objectDefaults>
+  <a:extraClrSchemeLst/>
+  <a:extLst>
+    <a:ext uri="{05A4C25C-085E-4340-85A3-A5531E510DB2}">
+      <thm15:themeFamily xmlns:thm15="http://schemas.microsoft.com/office/thememl/2012/main" name="Office Theme" id="{2E142A2C-CD16-42D6-873A-C26D2A0506FA}" vid="{1BDDFF52-6CD6-40A5-AB3C-68EB2F1E4D0A}"/>
+    </a:ext>
+  </a:extLst>
+</a:theme>
 </file>
</xml_diff>